<commit_message>
master data > button active validate edit product. hold bill> fix cant hold bill when get data from hold bill. fix get data from hold bill but cat pay validate min max on step edit cant cancel doc from hold bill list hold bill duplicate
</commit_message>
<xml_diff>
--- a/comment20210829.pptx
+++ b/comment20210829.pptx
@@ -14,6 +14,8 @@
     <p:sldId id="261" r:id="rId8"/>
     <p:sldId id="262" r:id="rId9"/>
     <p:sldId id="263" r:id="rId10"/>
+    <p:sldId id="265" r:id="rId11"/>
+    <p:sldId id="266" r:id="rId12"/>
   </p:sldIdLst>
   <p:sldSz cx="12192000" cy="6858000"/>
   <p:notesSz cx="6858000" cy="9144000"/>
@@ -112,6 +114,11 @@
       </a:defRPr>
     </a:lvl9pPr>
   </p:defaultTextStyle>
+  <p:extLst>
+    <p:ext uri="{EFAFB233-063F-42B5-8137-9DF3F51BA10A}">
+      <p15:sldGuideLst xmlns:p15="http://schemas.microsoft.com/office/powerpoint/2012/main"/>
+    </p:ext>
+  </p:extLst>
 </p:presentation>
 </file>
 
@@ -262,7 +269,7 @@
           <a:p>
             <a:fld id="{7E2837A0-30E2-47A6-BDB7-3A2E7B08A132}" type="datetimeFigureOut">
               <a:rPr lang="en-US" smtClean="0"/>
-              <a:t>29/08/2021</a:t>
+              <a:t>07/09/2021</a:t>
             </a:fld>
             <a:endParaRPr lang="en-US"/>
           </a:p>
@@ -460,7 +467,7 @@
           <a:p>
             <a:fld id="{7E2837A0-30E2-47A6-BDB7-3A2E7B08A132}" type="datetimeFigureOut">
               <a:rPr lang="en-US" smtClean="0"/>
-              <a:t>29/08/2021</a:t>
+              <a:t>07/09/2021</a:t>
             </a:fld>
             <a:endParaRPr lang="en-US"/>
           </a:p>
@@ -668,7 +675,7 @@
           <a:p>
             <a:fld id="{7E2837A0-30E2-47A6-BDB7-3A2E7B08A132}" type="datetimeFigureOut">
               <a:rPr lang="en-US" smtClean="0"/>
-              <a:t>29/08/2021</a:t>
+              <a:t>07/09/2021</a:t>
             </a:fld>
             <a:endParaRPr lang="en-US"/>
           </a:p>
@@ -866,7 +873,7 @@
           <a:p>
             <a:fld id="{7E2837A0-30E2-47A6-BDB7-3A2E7B08A132}" type="datetimeFigureOut">
               <a:rPr lang="en-US" smtClean="0"/>
-              <a:t>29/08/2021</a:t>
+              <a:t>07/09/2021</a:t>
             </a:fld>
             <a:endParaRPr lang="en-US"/>
           </a:p>
@@ -1141,7 +1148,7 @@
           <a:p>
             <a:fld id="{7E2837A0-30E2-47A6-BDB7-3A2E7B08A132}" type="datetimeFigureOut">
               <a:rPr lang="en-US" smtClean="0"/>
-              <a:t>29/08/2021</a:t>
+              <a:t>07/09/2021</a:t>
             </a:fld>
             <a:endParaRPr lang="en-US"/>
           </a:p>
@@ -1406,7 +1413,7 @@
           <a:p>
             <a:fld id="{7E2837A0-30E2-47A6-BDB7-3A2E7B08A132}" type="datetimeFigureOut">
               <a:rPr lang="en-US" smtClean="0"/>
-              <a:t>29/08/2021</a:t>
+              <a:t>07/09/2021</a:t>
             </a:fld>
             <a:endParaRPr lang="en-US"/>
           </a:p>
@@ -1818,7 +1825,7 @@
           <a:p>
             <a:fld id="{7E2837A0-30E2-47A6-BDB7-3A2E7B08A132}" type="datetimeFigureOut">
               <a:rPr lang="en-US" smtClean="0"/>
-              <a:t>29/08/2021</a:t>
+              <a:t>07/09/2021</a:t>
             </a:fld>
             <a:endParaRPr lang="en-US"/>
           </a:p>
@@ -1959,7 +1966,7 @@
           <a:p>
             <a:fld id="{7E2837A0-30E2-47A6-BDB7-3A2E7B08A132}" type="datetimeFigureOut">
               <a:rPr lang="en-US" smtClean="0"/>
-              <a:t>29/08/2021</a:t>
+              <a:t>07/09/2021</a:t>
             </a:fld>
             <a:endParaRPr lang="en-US"/>
           </a:p>
@@ -2072,7 +2079,7 @@
           <a:p>
             <a:fld id="{7E2837A0-30E2-47A6-BDB7-3A2E7B08A132}" type="datetimeFigureOut">
               <a:rPr lang="en-US" smtClean="0"/>
-              <a:t>29/08/2021</a:t>
+              <a:t>07/09/2021</a:t>
             </a:fld>
             <a:endParaRPr lang="en-US"/>
           </a:p>
@@ -2383,7 +2390,7 @@
           <a:p>
             <a:fld id="{7E2837A0-30E2-47A6-BDB7-3A2E7B08A132}" type="datetimeFigureOut">
               <a:rPr lang="en-US" smtClean="0"/>
-              <a:t>29/08/2021</a:t>
+              <a:t>07/09/2021</a:t>
             </a:fld>
             <a:endParaRPr lang="en-US"/>
           </a:p>
@@ -2671,7 +2678,7 @@
           <a:p>
             <a:fld id="{7E2837A0-30E2-47A6-BDB7-3A2E7B08A132}" type="datetimeFigureOut">
               <a:rPr lang="en-US" smtClean="0"/>
-              <a:t>29/08/2021</a:t>
+              <a:t>07/09/2021</a:t>
             </a:fld>
             <a:endParaRPr lang="en-US"/>
           </a:p>
@@ -2912,7 +2919,7 @@
           <a:p>
             <a:fld id="{7E2837A0-30E2-47A6-BDB7-3A2E7B08A132}" type="datetimeFigureOut">
               <a:rPr lang="en-US" smtClean="0"/>
-              <a:t>29/08/2021</a:t>
+              <a:t>07/09/2021</a:t>
             </a:fld>
             <a:endParaRPr lang="en-US"/>
           </a:p>
@@ -3727,6 +3734,246 @@
 </p:sld>
 </file>
 
+<file path=ppt/slides/slide10.xml><?xml version="1.0" encoding="utf-8"?>
+<p:sld xmlns:a="http://schemas.openxmlformats.org/drawingml/2006/main" xmlns:r="http://schemas.openxmlformats.org/officeDocument/2006/relationships" xmlns:p="http://schemas.openxmlformats.org/presentationml/2006/main">
+  <p:cSld>
+    <p:spTree>
+      <p:nvGrpSpPr>
+        <p:cNvPr id="1" name=""/>
+        <p:cNvGrpSpPr/>
+        <p:nvPr/>
+      </p:nvGrpSpPr>
+      <p:grpSpPr>
+        <a:xfrm>
+          <a:off x="0" y="0"/>
+          <a:ext cx="0" cy="0"/>
+          <a:chOff x="0" y="0"/>
+          <a:chExt cx="0" cy="0"/>
+        </a:xfrm>
+      </p:grpSpPr>
+      <p:pic>
+        <p:nvPicPr>
+          <p:cNvPr id="4" name="Picture 3">
+            <a:extLst>
+              <a:ext uri="{FF2B5EF4-FFF2-40B4-BE49-F238E27FC236}">
+                <a16:creationId xmlns:a16="http://schemas.microsoft.com/office/drawing/2014/main" id="{1B099806-784C-4544-A0DB-9CC905091B5A}"/>
+              </a:ext>
+            </a:extLst>
+          </p:cNvPr>
+          <p:cNvPicPr>
+            <a:picLocks noChangeAspect="1"/>
+          </p:cNvPicPr>
+          <p:nvPr/>
+        </p:nvPicPr>
+        <p:blipFill>
+          <a:blip r:embed="rId2"/>
+          <a:stretch>
+            <a:fillRect/>
+          </a:stretch>
+        </p:blipFill>
+        <p:spPr>
+          <a:xfrm>
+            <a:off x="732489" y="117620"/>
+            <a:ext cx="2461101" cy="2600867"/>
+          </a:xfrm>
+          <a:prstGeom prst="rect">
+            <a:avLst/>
+          </a:prstGeom>
+        </p:spPr>
+      </p:pic>
+      <p:pic>
+        <p:nvPicPr>
+          <p:cNvPr id="5" name="Picture 4">
+            <a:extLst>
+              <a:ext uri="{FF2B5EF4-FFF2-40B4-BE49-F238E27FC236}">
+                <a16:creationId xmlns:a16="http://schemas.microsoft.com/office/drawing/2014/main" id="{9B11CF00-EC20-4D5B-88EB-AB524B5A2557}"/>
+              </a:ext>
+            </a:extLst>
+          </p:cNvPr>
+          <p:cNvPicPr>
+            <a:picLocks noChangeAspect="1"/>
+          </p:cNvPicPr>
+          <p:nvPr/>
+        </p:nvPicPr>
+        <p:blipFill>
+          <a:blip r:embed="rId3"/>
+          <a:stretch>
+            <a:fillRect/>
+          </a:stretch>
+        </p:blipFill>
+        <p:spPr>
+          <a:xfrm>
+            <a:off x="4187894" y="117620"/>
+            <a:ext cx="3265662" cy="2600867"/>
+          </a:xfrm>
+          <a:prstGeom prst="rect">
+            <a:avLst/>
+          </a:prstGeom>
+        </p:spPr>
+      </p:pic>
+      <p:pic>
+        <p:nvPicPr>
+          <p:cNvPr id="6" name="Picture 5">
+            <a:extLst>
+              <a:ext uri="{FF2B5EF4-FFF2-40B4-BE49-F238E27FC236}">
+                <a16:creationId xmlns:a16="http://schemas.microsoft.com/office/drawing/2014/main" id="{1DF0BDE0-A19B-422A-96CF-6B65373DC864}"/>
+              </a:ext>
+            </a:extLst>
+          </p:cNvPr>
+          <p:cNvPicPr>
+            <a:picLocks noChangeAspect="1"/>
+          </p:cNvPicPr>
+          <p:nvPr/>
+        </p:nvPicPr>
+        <p:blipFill>
+          <a:blip r:embed="rId4"/>
+          <a:stretch>
+            <a:fillRect/>
+          </a:stretch>
+        </p:blipFill>
+        <p:spPr>
+          <a:xfrm>
+            <a:off x="335647" y="3529596"/>
+            <a:ext cx="6182588" cy="2715004"/>
+          </a:xfrm>
+          <a:prstGeom prst="rect">
+            <a:avLst/>
+          </a:prstGeom>
+        </p:spPr>
+      </p:pic>
+      <p:pic>
+        <p:nvPicPr>
+          <p:cNvPr id="7" name="Picture 6">
+            <a:extLst>
+              <a:ext uri="{FF2B5EF4-FFF2-40B4-BE49-F238E27FC236}">
+                <a16:creationId xmlns:a16="http://schemas.microsoft.com/office/drawing/2014/main" id="{EBF6E34A-39CB-444D-A1AA-8BA85178890F}"/>
+              </a:ext>
+            </a:extLst>
+          </p:cNvPr>
+          <p:cNvPicPr>
+            <a:picLocks noChangeAspect="1"/>
+          </p:cNvPicPr>
+          <p:nvPr/>
+        </p:nvPicPr>
+        <p:blipFill>
+          <a:blip r:embed="rId5"/>
+          <a:stretch>
+            <a:fillRect/>
+          </a:stretch>
+        </p:blipFill>
+        <p:spPr>
+          <a:xfrm>
+            <a:off x="7241059" y="51400"/>
+            <a:ext cx="4979774" cy="1667108"/>
+          </a:xfrm>
+          <a:prstGeom prst="rect">
+            <a:avLst/>
+          </a:prstGeom>
+        </p:spPr>
+      </p:pic>
+      <p:pic>
+        <p:nvPicPr>
+          <p:cNvPr id="8" name="Picture 7">
+            <a:extLst>
+              <a:ext uri="{FF2B5EF4-FFF2-40B4-BE49-F238E27FC236}">
+                <a16:creationId xmlns:a16="http://schemas.microsoft.com/office/drawing/2014/main" id="{F2253C62-A69D-443E-9C64-620DE893F2BC}"/>
+              </a:ext>
+            </a:extLst>
+          </p:cNvPr>
+          <p:cNvPicPr>
+            <a:picLocks noChangeAspect="1"/>
+          </p:cNvPicPr>
+          <p:nvPr/>
+        </p:nvPicPr>
+        <p:blipFill>
+          <a:blip r:embed="rId6"/>
+          <a:stretch>
+            <a:fillRect/>
+          </a:stretch>
+        </p:blipFill>
+        <p:spPr>
+          <a:xfrm>
+            <a:off x="5615160" y="3073939"/>
+            <a:ext cx="6744641" cy="3162741"/>
+          </a:xfrm>
+          <a:prstGeom prst="rect">
+            <a:avLst/>
+          </a:prstGeom>
+        </p:spPr>
+      </p:pic>
+    </p:spTree>
+    <p:extLst>
+      <p:ext uri="{BB962C8B-B14F-4D97-AF65-F5344CB8AC3E}">
+        <p14:creationId xmlns:p14="http://schemas.microsoft.com/office/powerpoint/2010/main" val="838198369"/>
+      </p:ext>
+    </p:extLst>
+  </p:cSld>
+  <p:clrMapOvr>
+    <a:masterClrMapping/>
+  </p:clrMapOvr>
+</p:sld>
+</file>
+
+<file path=ppt/slides/slide11.xml><?xml version="1.0" encoding="utf-8"?>
+<p:sld xmlns:a="http://schemas.openxmlformats.org/drawingml/2006/main" xmlns:r="http://schemas.openxmlformats.org/officeDocument/2006/relationships" xmlns:p="http://schemas.openxmlformats.org/presentationml/2006/main">
+  <p:cSld>
+    <p:spTree>
+      <p:nvGrpSpPr>
+        <p:cNvPr id="1" name=""/>
+        <p:cNvGrpSpPr/>
+        <p:nvPr/>
+      </p:nvGrpSpPr>
+      <p:grpSpPr>
+        <a:xfrm>
+          <a:off x="0" y="0"/>
+          <a:ext cx="0" cy="0"/>
+          <a:chOff x="0" y="0"/>
+          <a:chExt cx="0" cy="0"/>
+        </a:xfrm>
+      </p:grpSpPr>
+      <p:pic>
+        <p:nvPicPr>
+          <p:cNvPr id="4" name="Picture 3">
+            <a:extLst>
+              <a:ext uri="{FF2B5EF4-FFF2-40B4-BE49-F238E27FC236}">
+                <a16:creationId xmlns:a16="http://schemas.microsoft.com/office/drawing/2014/main" id="{535FA4A0-B397-4E18-BBBF-67790006DBD2}"/>
+              </a:ext>
+            </a:extLst>
+          </p:cNvPr>
+          <p:cNvPicPr>
+            <a:picLocks noChangeAspect="1"/>
+          </p:cNvPicPr>
+          <p:nvPr/>
+        </p:nvPicPr>
+        <p:blipFill>
+          <a:blip r:embed="rId2"/>
+          <a:stretch>
+            <a:fillRect/>
+          </a:stretch>
+        </p:blipFill>
+        <p:spPr>
+          <a:xfrm>
+            <a:off x="461431" y="140675"/>
+            <a:ext cx="7611537" cy="3858163"/>
+          </a:xfrm>
+          <a:prstGeom prst="rect">
+            <a:avLst/>
+          </a:prstGeom>
+        </p:spPr>
+      </p:pic>
+    </p:spTree>
+    <p:extLst>
+      <p:ext uri="{BB962C8B-B14F-4D97-AF65-F5344CB8AC3E}">
+        <p14:creationId xmlns:p14="http://schemas.microsoft.com/office/powerpoint/2010/main" val="886742534"/>
+      </p:ext>
+    </p:extLst>
+  </p:cSld>
+  <p:clrMapOvr>
+    <a:masterClrMapping/>
+  </p:clrMapOvr>
+</p:sld>
+</file>
+
 <file path=ppt/slides/slide2.xml><?xml version="1.0" encoding="utf-8"?>
 <p:sld xmlns:a="http://schemas.openxmlformats.org/drawingml/2006/main" xmlns:r="http://schemas.openxmlformats.org/officeDocument/2006/relationships" xmlns:p="http://schemas.openxmlformats.org/presentationml/2006/main">
   <p:cSld>

</xml_diff>